<commit_message>
news summ - notebook update
</commit_message>
<xml_diff>
--- a/PDF.pptx
+++ b/PDF.pptx
@@ -5,10 +5,11 @@
     <p:sldMasterId id="2147483648" r:id="rId1"/>
   </p:sldMasterIdLst>
   <p:sldIdLst>
-    <p:sldId id="257" r:id="rId2"/>
-    <p:sldId id="259" r:id="rId3"/>
+    <p:sldId id="259" r:id="rId2"/>
+    <p:sldId id="257" r:id="rId3"/>
     <p:sldId id="256" r:id="rId4"/>
-    <p:sldId id="258" r:id="rId5"/>
+    <p:sldId id="261" r:id="rId5"/>
+    <p:sldId id="260" r:id="rId6"/>
   </p:sldIdLst>
   <p:sldSz cx="12192000" cy="6858000"/>
   <p:notesSz cx="6858000" cy="9144000"/>
@@ -3329,7 +3330,7 @@
           <p:cNvPr id="2" name="Title 1">
             <a:extLst>
               <a:ext uri="{FF2B5EF4-FFF2-40B4-BE49-F238E27FC236}">
-                <a16:creationId xmlns:a16="http://schemas.microsoft.com/office/drawing/2014/main" id="{25A699D1-03BF-B542-9339-9622CD50CD1E}"/>
+                <a16:creationId xmlns:a16="http://schemas.microsoft.com/office/drawing/2014/main" id="{257FD851-E854-474C-B238-5F0FB620F5FC}"/>
               </a:ext>
             </a:extLst>
           </p:cNvPr>
@@ -3340,14 +3341,36 @@
             <p:ph type="title"/>
           </p:nvPr>
         </p:nvSpPr>
-        <p:spPr/>
-        <p:txBody>
-          <a:bodyPr/>
-          <a:lstStyle/>
-          <a:p>
+        <p:spPr>
+          <a:xfrm>
+            <a:off x="559594" y="1608137"/>
+            <a:ext cx="10515600" cy="1325563"/>
+          </a:xfrm>
+        </p:spPr>
+        <p:txBody>
+          <a:bodyPr>
+            <a:normAutofit fontScale="90000"/>
+          </a:bodyPr>
+          <a:lstStyle/>
+          <a:p>
+            <a:pPr algn="ctr"/>
             <a:r>
               <a:rPr lang="en-US" dirty="0"/>
-              <a:t>PDF – Portable File Format</a:t>
+              <a:t>Hands on Build Tools to Automate stuff </a:t>
+            </a:r>
+            <a:br>
+              <a:rPr lang="en-US" dirty="0"/>
+            </a:br>
+            <a:r>
+              <a:rPr lang="en-US" dirty="0"/>
+              <a:t>with Python</a:t>
+            </a:r>
+            <a:br>
+              <a:rPr lang="en-US" dirty="0"/>
+            </a:br>
+            <a:r>
+              <a:rPr lang="en-US" dirty="0"/>
+              <a:t>Table Extractor from PDF</a:t>
             </a:r>
           </a:p>
         </p:txBody>
@@ -3357,7 +3380,7 @@
           <p:cNvPr id="3" name="Content Placeholder 2">
             <a:extLst>
               <a:ext uri="{FF2B5EF4-FFF2-40B4-BE49-F238E27FC236}">
-                <a16:creationId xmlns:a16="http://schemas.microsoft.com/office/drawing/2014/main" id="{50F420FD-C694-0B4A-AB35-43AB91A18638}"/>
+                <a16:creationId xmlns:a16="http://schemas.microsoft.com/office/drawing/2014/main" id="{3A9C9047-E726-3047-877E-E9D41EA51B4D}"/>
               </a:ext>
             </a:extLst>
           </p:cNvPr>
@@ -3368,127 +3391,27 @@
             <p:ph idx="1"/>
           </p:nvPr>
         </p:nvSpPr>
-        <p:spPr/>
-        <p:txBody>
-          <a:bodyPr/>
-          <a:lstStyle/>
-          <a:p>
-            <a:r>
-              <a:rPr lang="en-IN" dirty="0"/>
-              <a:t>The </a:t>
-            </a:r>
-            <a:r>
-              <a:rPr lang="en-IN" b="1" dirty="0"/>
-              <a:t>Portable Document Format</a:t>
-            </a:r>
-            <a:r>
-              <a:rPr lang="en-IN" dirty="0"/>
-              <a:t> (</a:t>
-            </a:r>
-            <a:r>
-              <a:rPr lang="en-IN" b="1" dirty="0"/>
-              <a:t>PDF</a:t>
-            </a:r>
-            <a:r>
-              <a:rPr lang="en-IN" dirty="0"/>
-              <a:t>) is a </a:t>
-            </a:r>
-            <a:r>
-              <a:rPr lang="en-IN" dirty="0">
-                <a:hlinkClick r:id="rId2" tooltip="File format"/>
-              </a:rPr>
-              <a:t>file format</a:t>
-            </a:r>
-            <a:r>
-              <a:rPr lang="en-IN" dirty="0"/>
-              <a:t> developed by </a:t>
-            </a:r>
-            <a:r>
-              <a:rPr lang="en-IN" dirty="0">
-                <a:hlinkClick r:id="rId3" tooltip="Adobe Systems"/>
-              </a:rPr>
-              <a:t>Adobe</a:t>
-            </a:r>
-            <a:r>
-              <a:rPr lang="en-IN" dirty="0"/>
-              <a:t> in the 1990s to present </a:t>
-            </a:r>
-            <a:r>
-              <a:rPr lang="en-IN" dirty="0">
-                <a:hlinkClick r:id="rId4" tooltip="Document"/>
-              </a:rPr>
-              <a:t>documents</a:t>
-            </a:r>
-            <a:r>
-              <a:rPr lang="en-IN" dirty="0"/>
-              <a:t>, including text formatting and images, in a manner independent of </a:t>
-            </a:r>
-            <a:r>
-              <a:rPr lang="en-IN" dirty="0">
-                <a:hlinkClick r:id="rId5" tooltip="Application software"/>
-              </a:rPr>
-              <a:t>application software</a:t>
-            </a:r>
-            <a:r>
-              <a:rPr lang="en-IN" dirty="0"/>
-              <a:t>, </a:t>
-            </a:r>
-            <a:r>
-              <a:rPr lang="en-IN" dirty="0">
-                <a:hlinkClick r:id="rId6" tooltip="Computer hardware"/>
-              </a:rPr>
-              <a:t>hardware</a:t>
-            </a:r>
-            <a:r>
-              <a:rPr lang="en-IN" dirty="0"/>
-              <a:t>, and </a:t>
-            </a:r>
-            <a:r>
-              <a:rPr lang="en-IN" dirty="0">
-                <a:hlinkClick r:id="rId7" tooltip="Operating system"/>
-              </a:rPr>
-              <a:t>operating systems</a:t>
-            </a:r>
-            <a:r>
-              <a:rPr lang="en-IN" dirty="0"/>
-              <a:t>.</a:t>
-            </a:r>
-          </a:p>
-          <a:p>
-            <a:endParaRPr lang="en-IN" dirty="0"/>
-          </a:p>
-          <a:p>
-            <a:r>
-              <a:rPr lang="en-IN" dirty="0"/>
-              <a:t>The first version, 1.0, was introduced in 1993. </a:t>
-            </a:r>
-          </a:p>
-          <a:p>
-            <a:endParaRPr lang="en-IN" dirty="0"/>
-          </a:p>
-          <a:p>
-            <a:r>
-              <a:rPr lang="en-IN" dirty="0"/>
-              <a:t>PDF is based on the </a:t>
-            </a:r>
-            <a:r>
-              <a:rPr lang="en-IN" dirty="0">
-                <a:hlinkClick r:id="rId8" tooltip="PostScript"/>
-              </a:rPr>
-              <a:t>PostScript</a:t>
-            </a:r>
-            <a:r>
-              <a:rPr lang="en-IN" dirty="0"/>
-              <a:t> language, each PDF file encapsulates a complete description of a fixed-layout flat document</a:t>
-            </a:r>
-            <a:endParaRPr lang="en-US" dirty="0"/>
+        <p:spPr>
+          <a:xfrm>
+            <a:off x="4588668" y="3429000"/>
+            <a:ext cx="10515600" cy="4351338"/>
+          </a:xfrm>
+        </p:spPr>
+        <p:txBody>
+          <a:bodyPr/>
+          <a:lstStyle/>
+          <a:p>
+            <a:r>
+              <a:rPr lang="en-US" dirty="0"/>
+              <a:t>Overview</a:t>
+            </a:r>
           </a:p>
         </p:txBody>
       </p:sp>
     </p:spTree>
     <p:extLst>
       <p:ext uri="{BB962C8B-B14F-4D97-AF65-F5344CB8AC3E}">
-        <p14:creationId xmlns:p14="http://schemas.microsoft.com/office/powerpoint/2010/main" val="2270635150"/>
+        <p14:creationId xmlns:p14="http://schemas.microsoft.com/office/powerpoint/2010/main" val="3820861726"/>
       </p:ext>
     </p:extLst>
   </p:cSld>
@@ -3520,7 +3443,7 @@
           <p:cNvPr id="2" name="Title 1">
             <a:extLst>
               <a:ext uri="{FF2B5EF4-FFF2-40B4-BE49-F238E27FC236}">
-                <a16:creationId xmlns:a16="http://schemas.microsoft.com/office/drawing/2014/main" id="{257FD851-E854-474C-B238-5F0FB620F5FC}"/>
+                <a16:creationId xmlns:a16="http://schemas.microsoft.com/office/drawing/2014/main" id="{25A699D1-03BF-B542-9339-9622CD50CD1E}"/>
               </a:ext>
             </a:extLst>
           </p:cNvPr>
@@ -3531,19 +3454,14 @@
             <p:ph type="title"/>
           </p:nvPr>
         </p:nvSpPr>
-        <p:spPr>
-          <a:xfrm>
-            <a:off x="2024063" y="2265362"/>
-            <a:ext cx="10515600" cy="1325563"/>
-          </a:xfrm>
-        </p:spPr>
+        <p:spPr/>
         <p:txBody>
           <a:bodyPr/>
           <a:lstStyle/>
           <a:p>
             <a:r>
               <a:rPr lang="en-US" dirty="0"/>
-              <a:t>Table Extractor from PDF</a:t>
+              <a:t>PDF – Portable File Format</a:t>
             </a:r>
           </a:p>
         </p:txBody>
@@ -3553,7 +3471,7 @@
           <p:cNvPr id="3" name="Content Placeholder 2">
             <a:extLst>
               <a:ext uri="{FF2B5EF4-FFF2-40B4-BE49-F238E27FC236}">
-                <a16:creationId xmlns:a16="http://schemas.microsoft.com/office/drawing/2014/main" id="{3A9C9047-E726-3047-877E-E9D41EA51B4D}"/>
+                <a16:creationId xmlns:a16="http://schemas.microsoft.com/office/drawing/2014/main" id="{50F420FD-C694-0B4A-AB35-43AB91A18638}"/>
               </a:ext>
             </a:extLst>
           </p:cNvPr>
@@ -3564,27 +3482,137 @@
             <p:ph idx="1"/>
           </p:nvPr>
         </p:nvSpPr>
-        <p:spPr>
-          <a:xfrm>
-            <a:off x="3952875" y="3232944"/>
-            <a:ext cx="10515600" cy="4351338"/>
-          </a:xfrm>
-        </p:spPr>
-        <p:txBody>
-          <a:bodyPr/>
-          <a:lstStyle/>
-          <a:p>
-            <a:r>
-              <a:rPr lang="en-US" dirty="0"/>
-              <a:t>Overview</a:t>
-            </a:r>
+        <p:spPr/>
+        <p:txBody>
+          <a:bodyPr>
+            <a:normAutofit lnSpcReduction="10000"/>
+          </a:bodyPr>
+          <a:lstStyle/>
+          <a:p>
+            <a:r>
+              <a:rPr lang="en-IN" dirty="0"/>
+              <a:t>The </a:t>
+            </a:r>
+            <a:r>
+              <a:rPr lang="en-IN" b="1" dirty="0"/>
+              <a:t>Portable Document Format</a:t>
+            </a:r>
+            <a:r>
+              <a:rPr lang="en-IN" dirty="0"/>
+              <a:t> (</a:t>
+            </a:r>
+            <a:r>
+              <a:rPr lang="en-IN" b="1" dirty="0"/>
+              <a:t>PDF</a:t>
+            </a:r>
+            <a:r>
+              <a:rPr lang="en-IN" dirty="0"/>
+              <a:t>) is a </a:t>
+            </a:r>
+            <a:r>
+              <a:rPr lang="en-IN" dirty="0">
+                <a:hlinkClick r:id="rId2" tooltip="File format"/>
+              </a:rPr>
+              <a:t>file format</a:t>
+            </a:r>
+            <a:r>
+              <a:rPr lang="en-IN" dirty="0"/>
+              <a:t> developed by </a:t>
+            </a:r>
+            <a:r>
+              <a:rPr lang="en-IN" dirty="0">
+                <a:hlinkClick r:id="rId3" tooltip="Adobe Systems"/>
+              </a:rPr>
+              <a:t>Adobe</a:t>
+            </a:r>
+            <a:r>
+              <a:rPr lang="en-IN" dirty="0"/>
+              <a:t> in the 1990s to present </a:t>
+            </a:r>
+            <a:r>
+              <a:rPr lang="en-IN" dirty="0">
+                <a:hlinkClick r:id="rId4" tooltip="Document"/>
+              </a:rPr>
+              <a:t>documents</a:t>
+            </a:r>
+            <a:r>
+              <a:rPr lang="en-IN" dirty="0"/>
+              <a:t> that include text, graphics and images, independent of </a:t>
+            </a:r>
+            <a:r>
+              <a:rPr lang="en-IN" dirty="0">
+                <a:hlinkClick r:id="rId5" tooltip="Application software"/>
+              </a:rPr>
+              <a:t>  software</a:t>
+            </a:r>
+            <a:r>
+              <a:rPr lang="en-IN" dirty="0"/>
+              <a:t>, </a:t>
+            </a:r>
+            <a:r>
+              <a:rPr lang="en-IN" dirty="0">
+                <a:hlinkClick r:id="rId6" tooltip="Computer hardware"/>
+              </a:rPr>
+              <a:t>hardware</a:t>
+            </a:r>
+            <a:r>
+              <a:rPr lang="en-IN" dirty="0"/>
+              <a:t>, and </a:t>
+            </a:r>
+            <a:r>
+              <a:rPr lang="en-IN" dirty="0">
+                <a:hlinkClick r:id="rId7" tooltip="Operating system"/>
+              </a:rPr>
+              <a:t>operating systems</a:t>
+            </a:r>
+            <a:r>
+              <a:rPr lang="en-IN" dirty="0"/>
+              <a:t>. Let’s say, Whether It’s </a:t>
+            </a:r>
+            <a:r>
+              <a:rPr lang="en-IN" dirty="0" err="1"/>
+              <a:t>Appple</a:t>
+            </a:r>
+            <a:r>
+              <a:rPr lang="en-IN" dirty="0"/>
+              <a:t> Mac or Microsoft Windows – a document should look the same and hence PDF was developed. </a:t>
+            </a:r>
+          </a:p>
+          <a:p>
+            <a:endParaRPr lang="en-IN" dirty="0"/>
+          </a:p>
+          <a:p>
+            <a:r>
+              <a:rPr lang="en-IN" dirty="0"/>
+              <a:t>The first version, 1.0, was introduced in 1993. </a:t>
+            </a:r>
+          </a:p>
+          <a:p>
+            <a:endParaRPr lang="en-IN" dirty="0"/>
+          </a:p>
+          <a:p>
+            <a:r>
+              <a:rPr lang="en-IN" dirty="0"/>
+              <a:t>PDF is based on the </a:t>
+            </a:r>
+            <a:r>
+              <a:rPr lang="en-IN" dirty="0">
+                <a:hlinkClick r:id="rId8" tooltip="PostScript"/>
+              </a:rPr>
+              <a:t>PostScript</a:t>
+            </a:r>
+            <a:r>
+              <a:rPr lang="en-IN" dirty="0"/>
+              <a:t> language, each PDF file encapsulates a complete description of a fixed-layout flat document</a:t>
+            </a:r>
+            <a:endParaRPr lang="en-US" dirty="0"/>
           </a:p>
         </p:txBody>
       </p:sp>
     </p:spTree>
     <p:extLst>
       <p:ext uri="{BB962C8B-B14F-4D97-AF65-F5344CB8AC3E}">
-        <p14:creationId xmlns:p14="http://schemas.microsoft.com/office/powerpoint/2010/main" val="3820861726"/>
+        <p14:creationId xmlns:p14="http://schemas.microsoft.com/office/powerpoint/2010/main" val="2270635150"/>
       </p:ext>
     </p:extLst>
   </p:cSld>
@@ -4279,105 +4307,234 @@
           <p:cNvPr id="4" name="Rectangle 3">
             <a:extLst>
               <a:ext uri="{FF2B5EF4-FFF2-40B4-BE49-F238E27FC236}">
-                <a16:creationId xmlns:a16="http://schemas.microsoft.com/office/drawing/2014/main" id="{8F1A7B5F-165C-BC42-8F5A-6F14D8CC538C}"/>
-              </a:ext>
-            </a:extLst>
-          </p:cNvPr>
-          <p:cNvSpPr>
-            <a:spLocks noChangeArrowheads="1"/>
-          </p:cNvSpPr>
+                <a16:creationId xmlns:a16="http://schemas.microsoft.com/office/drawing/2014/main" id="{A9A4F2BC-C64A-8E44-A0FA-6593FF527F20}"/>
+              </a:ext>
+            </a:extLst>
+          </p:cNvPr>
+          <p:cNvSpPr/>
           <p:nvPr/>
         </p:nvSpPr>
-        <p:spPr bwMode="auto">
+        <p:spPr>
           <a:xfrm>
-            <a:off x="1849820" y="3059668"/>
-            <a:ext cx="7998373" cy="369332"/>
+            <a:off x="1007269" y="792956"/>
+            <a:ext cx="8136731" cy="2677656"/>
           </a:xfrm>
           <a:prstGeom prst="rect">
             <a:avLst/>
           </a:prstGeom>
-          <a:noFill/>
-          <a:ln>
-            <a:noFill/>
-          </a:ln>
-          <a:effectLst/>
-          <a:extLst>
-            <a:ext uri="{909E8E84-426E-40DD-AFC4-6F175D3DCCD1}">
-              <a14:hiddenFill xmlns:a14="http://schemas.microsoft.com/office/drawing/2010/main">
-                <a:solidFill>
-                  <a:schemeClr val="accent1"/>
-                </a:solidFill>
-              </a14:hiddenFill>
-            </a:ext>
-            <a:ext uri="{91240B29-F687-4F45-9708-019B960494DF}">
-              <a14:hiddenLine xmlns:a14="http://schemas.microsoft.com/office/drawing/2010/main" w="9525">
-                <a:solidFill>
-                  <a:schemeClr val="tx1"/>
-                </a:solidFill>
-                <a:miter lim="800000"/>
-                <a:headEnd/>
-                <a:tailEnd/>
-              </a14:hiddenLine>
-            </a:ext>
-            <a:ext uri="{AF507438-7753-43E0-B8FC-AC1667EBCBE1}">
-              <a14:hiddenEffects xmlns:a14="http://schemas.microsoft.com/office/drawing/2010/main">
-                <a:effectLst>
-                  <a:outerShdw dist="35921" dir="2700000" algn="ctr" rotWithShape="0">
-                    <a:schemeClr val="bg2"/>
-                  </a:outerShdw>
-                </a:effectLst>
-              </a14:hiddenEffects>
-            </a:ext>
-          </a:extLst>
         </p:spPr>
         <p:txBody>
-          <a:bodyPr vert="horz" wrap="square" lIns="91440" tIns="45720" rIns="91440" bIns="45720" numCol="1" anchor="ctr" anchorCtr="0" compatLnSpc="1">
-            <a:prstTxWarp prst="textNoShape">
-              <a:avLst/>
-            </a:prstTxWarp>
+          <a:bodyPr wrap="square">
             <a:spAutoFit/>
           </a:bodyPr>
           <a:lstStyle/>
           <a:p>
-            <a:pPr lvl="0" eaLnBrk="0" fontAlgn="base" hangingPunct="0">
-              <a:spcBef>
-                <a:spcPct val="0"/>
-              </a:spcBef>
-              <a:spcAft>
-                <a:spcPct val="0"/>
-              </a:spcAft>
-            </a:pPr>
-            <a:r>
-              <a:rPr lang="en-IN" dirty="0"/>
-              <a:t>In 2008 , PDF was standardized as an </a:t>
-            </a:r>
-            <a:r>
-              <a:rPr lang="en-IN" dirty="0">
-                <a:hlinkClick r:id="rId2" tooltip="Open format"/>
+            <a:r>
+              <a:rPr lang="en-IN" sz="2400" b="1" dirty="0"/>
+              <a:t>Other Python Modules:</a:t>
+            </a:r>
+          </a:p>
+          <a:p>
+            <a:endParaRPr lang="en-IN" sz="2400" b="1" dirty="0"/>
+          </a:p>
+          <a:p>
+            <a:endParaRPr lang="en-IN" sz="2400" b="1" dirty="0"/>
+          </a:p>
+          <a:p>
+            <a:r>
+              <a:rPr lang="en-IN" sz="2400" dirty="0">
+                <a:hlinkClick r:id="rId2"/>
               </a:rPr>
-              <a:t>open format</a:t>
-            </a:r>
-            <a:r>
-              <a:rPr lang="en-IN" dirty="0"/>
-              <a:t>, ISO 32000</a:t>
-            </a:r>
-            <a:endParaRPr kumimoji="0" lang="en-US" altLang="en-US" sz="1800" b="0" i="0" u="none" strike="noStrike" cap="none" normalizeH="0" baseline="0" dirty="0">
-              <a:ln>
-                <a:noFill/>
-              </a:ln>
-              <a:solidFill>
-                <a:schemeClr val="tx1"/>
-              </a:solidFill>
-              <a:effectLst/>
-              <a:latin typeface="Arial" panose="020B0604020202020204" pitchFamily="34" charset="0"/>
-            </a:endParaRPr>
+              <a:t>Tabula</a:t>
+            </a:r>
+            <a:endParaRPr lang="en-IN" sz="2400" dirty="0"/>
+          </a:p>
+          <a:p>
+            <a:r>
+              <a:rPr lang="en-IN" sz="2400" dirty="0">
+                <a:hlinkClick r:id="rId3"/>
+              </a:rPr>
+              <a:t>pdfplumber</a:t>
+            </a:r>
+            <a:endParaRPr lang="en-IN" sz="2400" dirty="0"/>
+          </a:p>
+          <a:p>
+            <a:r>
+              <a:rPr lang="en-IN" sz="2400" dirty="0">
+                <a:hlinkClick r:id="rId4"/>
+              </a:rPr>
+              <a:t>pdftables</a:t>
+            </a:r>
+            <a:endParaRPr lang="en-IN" sz="2400" dirty="0"/>
+          </a:p>
+          <a:p>
+            <a:r>
+              <a:rPr lang="en-IN" sz="2400" dirty="0">
+                <a:hlinkClick r:id="rId5"/>
+              </a:rPr>
+              <a:t>pdf-table-extract</a:t>
+            </a:r>
+            <a:endParaRPr lang="en-IN" sz="2400" dirty="0"/>
           </a:p>
         </p:txBody>
       </p:sp>
     </p:spTree>
     <p:extLst>
       <p:ext uri="{BB962C8B-B14F-4D97-AF65-F5344CB8AC3E}">
-        <p14:creationId xmlns:p14="http://schemas.microsoft.com/office/powerpoint/2010/main" val="2186830824"/>
+        <p14:creationId xmlns:p14="http://schemas.microsoft.com/office/powerpoint/2010/main" val="4156727795"/>
+      </p:ext>
+    </p:extLst>
+  </p:cSld>
+  <p:clrMapOvr>
+    <a:masterClrMapping/>
+  </p:clrMapOvr>
+</p:sld>
+</file>
+
+<file path=ppt/slides/slide5.xml><?xml version="1.0" encoding="utf-8"?>
+<p:sld xmlns:a="http://schemas.openxmlformats.org/drawingml/2006/main" xmlns:r="http://schemas.openxmlformats.org/officeDocument/2006/relationships" xmlns:p="http://schemas.openxmlformats.org/presentationml/2006/main">
+  <p:cSld>
+    <p:spTree>
+      <p:nvGrpSpPr>
+        <p:cNvPr id="1" name=""/>
+        <p:cNvGrpSpPr/>
+        <p:nvPr/>
+      </p:nvGrpSpPr>
+      <p:grpSpPr>
+        <a:xfrm>
+          <a:off x="0" y="0"/>
+          <a:ext cx="0" cy="0"/>
+          <a:chOff x="0" y="0"/>
+          <a:chExt cx="0" cy="0"/>
+        </a:xfrm>
+      </p:grpSpPr>
+      <p:sp>
+        <p:nvSpPr>
+          <p:cNvPr id="4" name="Rectangle 3">
+            <a:extLst>
+              <a:ext uri="{FF2B5EF4-FFF2-40B4-BE49-F238E27FC236}">
+                <a16:creationId xmlns:a16="http://schemas.microsoft.com/office/drawing/2014/main" id="{A9A4F2BC-C64A-8E44-A0FA-6593FF527F20}"/>
+              </a:ext>
+            </a:extLst>
+          </p:cNvPr>
+          <p:cNvSpPr/>
+          <p:nvPr/>
+        </p:nvSpPr>
+        <p:spPr>
+          <a:xfrm>
+            <a:off x="1007269" y="792956"/>
+            <a:ext cx="8136731" cy="4154984"/>
+          </a:xfrm>
+          <a:prstGeom prst="rect">
+            <a:avLst/>
+          </a:prstGeom>
+        </p:spPr>
+        <p:txBody>
+          <a:bodyPr wrap="square">
+            <a:spAutoFit/>
+          </a:bodyPr>
+          <a:lstStyle/>
+          <a:p>
+            <a:r>
+              <a:rPr lang="en-IN" sz="2400" b="1" dirty="0"/>
+              <a:t>Why Camelot?</a:t>
+            </a:r>
+            <a:r>
+              <a:rPr lang="en-IN" sz="2400" b="1" dirty="0">
+                <a:hlinkClick r:id="rId2" tooltip="Permalink to this headline"/>
+              </a:rPr>
+              <a:t>¶</a:t>
+            </a:r>
+            <a:endParaRPr lang="en-IN" sz="2400" b="1" dirty="0"/>
+          </a:p>
+          <a:p>
+            <a:pPr>
+              <a:buFont typeface="Arial" panose="020B0604020202020204" pitchFamily="34" charset="0"/>
+              <a:buChar char="•"/>
+            </a:pPr>
+            <a:r>
+              <a:rPr lang="en-IN" sz="2400" b="1" dirty="0"/>
+              <a:t>You are in control.</a:t>
+            </a:r>
+            <a:r>
+              <a:rPr lang="en-IN" sz="2400" dirty="0"/>
+              <a:t> Unlike other libraries and tools which either give a nice output or fail miserably (with no in-between), Camelot gives you the power to tweak table extraction. (This is important since everything in the real world, including PDF table extraction, is fuzzy.)</a:t>
+            </a:r>
+          </a:p>
+          <a:p>
+            <a:pPr>
+              <a:buFont typeface="Arial" panose="020B0604020202020204" pitchFamily="34" charset="0"/>
+              <a:buChar char="•"/>
+            </a:pPr>
+            <a:r>
+              <a:rPr lang="en-IN" sz="2400" i="1" dirty="0"/>
+              <a:t>Bad</a:t>
+            </a:r>
+            <a:r>
+              <a:rPr lang="en-IN" sz="2400" dirty="0"/>
+              <a:t> tables can be discarded based on </a:t>
+            </a:r>
+            <a:r>
+              <a:rPr lang="en-IN" sz="2400" b="1" dirty="0"/>
+              <a:t>metrics</a:t>
+            </a:r>
+            <a:r>
+              <a:rPr lang="en-IN" sz="2400" dirty="0"/>
+              <a:t> like accuracy and whitespace, without ever having to manually look at each table.</a:t>
+            </a:r>
+          </a:p>
+          <a:p>
+            <a:pPr>
+              <a:buFont typeface="Arial" panose="020B0604020202020204" pitchFamily="34" charset="0"/>
+              <a:buChar char="•"/>
+            </a:pPr>
+            <a:r>
+              <a:rPr lang="en-IN" sz="2400" dirty="0"/>
+              <a:t>Each table is a </a:t>
+            </a:r>
+            <a:r>
+              <a:rPr lang="en-IN" sz="2400" b="1" dirty="0"/>
+              <a:t>pandas </a:t>
+            </a:r>
+            <a:r>
+              <a:rPr lang="en-IN" sz="2400" b="1" dirty="0" err="1"/>
+              <a:t>DataFrame</a:t>
+            </a:r>
+            <a:r>
+              <a:rPr lang="en-IN" sz="2400" dirty="0"/>
+              <a:t>, which seamlessly integrates into </a:t>
+            </a:r>
+            <a:r>
+              <a:rPr lang="en-IN" sz="2400" dirty="0">
+                <a:hlinkClick r:id="rId3"/>
+              </a:rPr>
+              <a:t>ETL and data analysis workflows</a:t>
+            </a:r>
+            <a:r>
+              <a:rPr lang="en-IN" sz="2400" dirty="0"/>
+              <a:t>.</a:t>
+            </a:r>
+          </a:p>
+          <a:p>
+            <a:pPr>
+              <a:buFont typeface="Arial" panose="020B0604020202020204" pitchFamily="34" charset="0"/>
+              <a:buChar char="•"/>
+            </a:pPr>
+            <a:r>
+              <a:rPr lang="en-IN" sz="2400" b="1" dirty="0"/>
+              <a:t>Export</a:t>
+            </a:r>
+            <a:r>
+              <a:rPr lang="en-IN" sz="2400" dirty="0"/>
+              <a:t> to multiple formats, including JSON, Excel and HTML.</a:t>
+            </a:r>
+          </a:p>
+        </p:txBody>
+      </p:sp>
+    </p:spTree>
+    <p:extLst>
+      <p:ext uri="{BB962C8B-B14F-4D97-AF65-F5344CB8AC3E}">
+        <p14:creationId xmlns:p14="http://schemas.microsoft.com/office/powerpoint/2010/main" val="3336022679"/>
       </p:ext>
     </p:extLst>
   </p:cSld>

</xml_diff>